<commit_message>
benefits and editions changes
</commit_message>
<xml_diff>
--- a/public/images/Presentaci�n.pptx
+++ b/public/images/Presentaci�n.pptx
@@ -8,6 +8,7 @@
     <p:sldId id="257" r:id="rId2"/>
     <p:sldId id="258" r:id="rId3"/>
     <p:sldId id="259" r:id="rId4"/>
+    <p:sldId id="260" r:id="rId5"/>
   </p:sldIdLst>
   <p:sldSz cx="9144000" cy="6858000" type="screen4x3"/>
   <p:notesSz cx="6858000" cy="9144000"/>
@@ -1911,9 +1912,9 @@
   <dgm:cxnLst>
     <dgm:cxn modelId="{AF5F14F8-A780-4194-9B86-EF03CEC4DD69}" type="presOf" srcId="{C2382DD6-AF16-4A2E-98CE-079F23A7E270}" destId="{4D3B9672-6C38-4207-BA18-CF44F5613C93}" srcOrd="0" destOrd="0" presId="urn:diagrams.loki3.com/TabbedArc+Icon"/>
     <dgm:cxn modelId="{0F251C66-E863-4E41-B860-B911DC04504C}" srcId="{754F0332-9382-4205-9A5E-912C49BBFF2A}" destId="{A2B1EB71-A885-45D7-AF26-C9F2A86BEA23}" srcOrd="1" destOrd="0" parTransId="{7A07C5B3-F8B3-44AE-8E6C-D599C40EAB45}" sibTransId="{7A131836-1C30-4AE2-A6B6-9E2B66DA5381}"/>
+    <dgm:cxn modelId="{0ABCEC72-27AC-4A26-A0B2-576FAEF4701B}" srcId="{754F0332-9382-4205-9A5E-912C49BBFF2A}" destId="{1FD990C4-003E-4AF1-9A2B-140A013815FF}" srcOrd="2" destOrd="0" parTransId="{19E3C3B9-05E1-46CB-901A-086F741902B0}" sibTransId="{5077A80F-9B00-4D2E-8452-8E26ACFE4BF2}"/>
+    <dgm:cxn modelId="{A8FCEF83-BC6D-44B4-9888-3FD42E16D147}" type="presOf" srcId="{A2B1EB71-A885-45D7-AF26-C9F2A86BEA23}" destId="{039CD981-8542-4F05-94E4-354C84181A12}" srcOrd="0" destOrd="0" presId="urn:diagrams.loki3.com/TabbedArc+Icon"/>
     <dgm:cxn modelId="{A0705878-1342-4604-9B4A-BB232A679D0B}" type="presOf" srcId="{754F0332-9382-4205-9A5E-912C49BBFF2A}" destId="{6E095B7A-E8CE-446C-BB41-27A4C02090C5}" srcOrd="0" destOrd="0" presId="urn:diagrams.loki3.com/TabbedArc+Icon"/>
-    <dgm:cxn modelId="{A8FCEF83-BC6D-44B4-9888-3FD42E16D147}" type="presOf" srcId="{A2B1EB71-A885-45D7-AF26-C9F2A86BEA23}" destId="{039CD981-8542-4F05-94E4-354C84181A12}" srcOrd="0" destOrd="0" presId="urn:diagrams.loki3.com/TabbedArc+Icon"/>
-    <dgm:cxn modelId="{0ABCEC72-27AC-4A26-A0B2-576FAEF4701B}" srcId="{754F0332-9382-4205-9A5E-912C49BBFF2A}" destId="{1FD990C4-003E-4AF1-9A2B-140A013815FF}" srcOrd="2" destOrd="0" parTransId="{19E3C3B9-05E1-46CB-901A-086F741902B0}" sibTransId="{5077A80F-9B00-4D2E-8452-8E26ACFE4BF2}"/>
     <dgm:cxn modelId="{CA0ACC47-BA29-4BED-8054-C3C6990372BC}" srcId="{754F0332-9382-4205-9A5E-912C49BBFF2A}" destId="{C2382DD6-AF16-4A2E-98CE-079F23A7E270}" srcOrd="0" destOrd="0" parTransId="{2FB76A12-E189-4318-9C29-7A9592694E72}" sibTransId="{6E872459-2F03-4B6C-9626-67F842A1F6FB}"/>
     <dgm:cxn modelId="{6D422896-E5F6-4717-9238-3A3B272CCD38}" type="presOf" srcId="{1FD990C4-003E-4AF1-9A2B-140A013815FF}" destId="{ED4E6BC4-6976-4C70-A8F5-8B440420D76F}" srcOrd="0" destOrd="0" presId="urn:diagrams.loki3.com/TabbedArc+Icon"/>
     <dgm:cxn modelId="{813EC1FD-67F5-4B6B-BD4C-7BDAE4B57283}" type="presParOf" srcId="{6E095B7A-E8CE-446C-BB41-27A4C02090C5}" destId="{4D3B9672-6C38-4207-BA18-CF44F5613C93}" srcOrd="0" destOrd="0" presId="urn:diagrams.loki3.com/TabbedArc+Icon"/>
@@ -4938,7 +4939,7 @@
           <a:p>
             <a:fld id="{B6B09CD3-E129-4CA6-9497-2B3B999BCEC1}" type="datetimeFigureOut">
               <a:rPr lang="es-CO" smtClean="0"/>
-              <a:t>14/02/2012</a:t>
+              <a:t>15/02/2012</a:t>
             </a:fld>
             <a:endParaRPr lang="es-CO"/>
           </a:p>
@@ -5108,7 +5109,7 @@
           <a:p>
             <a:fld id="{B6B09CD3-E129-4CA6-9497-2B3B999BCEC1}" type="datetimeFigureOut">
               <a:rPr lang="es-CO" smtClean="0"/>
-              <a:t>14/02/2012</a:t>
+              <a:t>15/02/2012</a:t>
             </a:fld>
             <a:endParaRPr lang="es-CO"/>
           </a:p>
@@ -5288,7 +5289,7 @@
           <a:p>
             <a:fld id="{B6B09CD3-E129-4CA6-9497-2B3B999BCEC1}" type="datetimeFigureOut">
               <a:rPr lang="es-CO" smtClean="0"/>
-              <a:t>14/02/2012</a:t>
+              <a:t>15/02/2012</a:t>
             </a:fld>
             <a:endParaRPr lang="es-CO"/>
           </a:p>
@@ -5458,7 +5459,7 @@
           <a:p>
             <a:fld id="{B6B09CD3-E129-4CA6-9497-2B3B999BCEC1}" type="datetimeFigureOut">
               <a:rPr lang="es-CO" smtClean="0"/>
-              <a:t>14/02/2012</a:t>
+              <a:t>15/02/2012</a:t>
             </a:fld>
             <a:endParaRPr lang="es-CO"/>
           </a:p>
@@ -5704,7 +5705,7 @@
           <a:p>
             <a:fld id="{B6B09CD3-E129-4CA6-9497-2B3B999BCEC1}" type="datetimeFigureOut">
               <a:rPr lang="es-CO" smtClean="0"/>
-              <a:t>14/02/2012</a:t>
+              <a:t>15/02/2012</a:t>
             </a:fld>
             <a:endParaRPr lang="es-CO"/>
           </a:p>
@@ -5992,7 +5993,7 @@
           <a:p>
             <a:fld id="{B6B09CD3-E129-4CA6-9497-2B3B999BCEC1}" type="datetimeFigureOut">
               <a:rPr lang="es-CO" smtClean="0"/>
-              <a:t>14/02/2012</a:t>
+              <a:t>15/02/2012</a:t>
             </a:fld>
             <a:endParaRPr lang="es-CO"/>
           </a:p>
@@ -6414,7 +6415,7 @@
           <a:p>
             <a:fld id="{B6B09CD3-E129-4CA6-9497-2B3B999BCEC1}" type="datetimeFigureOut">
               <a:rPr lang="es-CO" smtClean="0"/>
-              <a:t>14/02/2012</a:t>
+              <a:t>15/02/2012</a:t>
             </a:fld>
             <a:endParaRPr lang="es-CO"/>
           </a:p>
@@ -6532,7 +6533,7 @@
           <a:p>
             <a:fld id="{B6B09CD3-E129-4CA6-9497-2B3B999BCEC1}" type="datetimeFigureOut">
               <a:rPr lang="es-CO" smtClean="0"/>
-              <a:t>14/02/2012</a:t>
+              <a:t>15/02/2012</a:t>
             </a:fld>
             <a:endParaRPr lang="es-CO"/>
           </a:p>
@@ -6627,7 +6628,7 @@
           <a:p>
             <a:fld id="{B6B09CD3-E129-4CA6-9497-2B3B999BCEC1}" type="datetimeFigureOut">
               <a:rPr lang="es-CO" smtClean="0"/>
-              <a:t>14/02/2012</a:t>
+              <a:t>15/02/2012</a:t>
             </a:fld>
             <a:endParaRPr lang="es-CO"/>
           </a:p>
@@ -6904,7 +6905,7 @@
           <a:p>
             <a:fld id="{B6B09CD3-E129-4CA6-9497-2B3B999BCEC1}" type="datetimeFigureOut">
               <a:rPr lang="es-CO" smtClean="0"/>
-              <a:t>14/02/2012</a:t>
+              <a:t>15/02/2012</a:t>
             </a:fld>
             <a:endParaRPr lang="es-CO"/>
           </a:p>
@@ -7157,7 +7158,7 @@
           <a:p>
             <a:fld id="{B6B09CD3-E129-4CA6-9497-2B3B999BCEC1}" type="datetimeFigureOut">
               <a:rPr lang="es-CO" smtClean="0"/>
-              <a:t>14/02/2012</a:t>
+              <a:t>15/02/2012</a:t>
             </a:fld>
             <a:endParaRPr lang="es-CO"/>
           </a:p>
@@ -7370,7 +7371,7 @@
           <a:p>
             <a:fld id="{B6B09CD3-E129-4CA6-9497-2B3B999BCEC1}" type="datetimeFigureOut">
               <a:rPr lang="es-CO" smtClean="0"/>
-              <a:t>14/02/2012</a:t>
+              <a:t>15/02/2012</a:t>
             </a:fld>
             <a:endParaRPr lang="es-CO"/>
           </a:p>
@@ -8289,7 +8290,7 @@
           <p:nvPr>
             <p:extLst>
               <p:ext uri="{D42A27DB-BD31-4B8C-83A1-F6EECF244321}">
-                <p14:modId xmlns:p14="http://schemas.microsoft.com/office/powerpoint/2010/main" val="3800185212"/>
+                <p14:modId xmlns:p14="http://schemas.microsoft.com/office/powerpoint/2010/main" val="3903023602"/>
               </p:ext>
             </p:extLst>
           </p:nvPr>
@@ -8593,7 +8594,23 @@
                       </a:r>
                       <a:r>
                         <a:rPr lang="es-CO" b="1" baseline="0" dirty="0" smtClean="0"/>
-                        <a:t> y monitoreo de metas  y desempeño</a:t>
+                        <a:t> </a:t>
+                      </a:r>
+                      <a:r>
+                        <a:rPr lang="es-CO" b="1" baseline="0" dirty="0" smtClean="0"/>
+                        <a:t>de </a:t>
+                      </a:r>
+                      <a:r>
+                        <a:rPr lang="es-CO" b="1" baseline="0" dirty="0" smtClean="0"/>
+                        <a:t>metas  </a:t>
+                      </a:r>
+                      <a:r>
+                        <a:rPr lang="es-CO" b="1" baseline="0" smtClean="0"/>
+                        <a:t>y </a:t>
+                      </a:r>
+                      <a:r>
+                        <a:rPr lang="es-CO" b="1" baseline="0" smtClean="0"/>
+                        <a:t>desempeño</a:t>
                       </a:r>
                       <a:endParaRPr lang="es-CO" b="1" dirty="0"/>
                     </a:p>
@@ -9496,11 +9513,7 @@
                       </a:pPr>
                       <a:r>
                         <a:rPr lang="es-CO" b="1" baseline="0" dirty="0" smtClean="0"/>
-                        <a:t>Controlas tu desempeño </a:t>
-                      </a:r>
-                      <a:r>
-                        <a:rPr lang="es-CO" b="1" baseline="0" dirty="0" smtClean="0"/>
-                        <a:t>y resultados</a:t>
+                        <a:t>Controlas tu desempeño y resultados</a:t>
                       </a:r>
                       <a:endParaRPr lang="es-CO" b="1" dirty="0"/>
                     </a:p>
@@ -9520,15 +9533,7 @@
                       </a:r>
                       <a:r>
                         <a:rPr lang="es-CO" b="1" baseline="0" dirty="0" smtClean="0"/>
-                        <a:t> de la </a:t>
-                      </a:r>
-                      <a:r>
-                        <a:rPr lang="es-CO" b="1" baseline="0" dirty="0" smtClean="0"/>
-                        <a:t>satisfacción </a:t>
-                      </a:r>
-                      <a:r>
-                        <a:rPr lang="es-CO" b="1" baseline="0" dirty="0" smtClean="0"/>
-                        <a:t>de tus clientes</a:t>
+                        <a:t> de la satisfacción de tus clientes</a:t>
                       </a:r>
                       <a:endParaRPr lang="es-CO" b="1" dirty="0"/>
                     </a:p>
@@ -9672,6 +9677,409 @@
     <p:extLst>
       <p:ext uri="{BB962C8B-B14F-4D97-AF65-F5344CB8AC3E}">
         <p14:creationId xmlns:p14="http://schemas.microsoft.com/office/powerpoint/2010/main" val="4120432410"/>
+      </p:ext>
+    </p:extLst>
+  </p:cSld>
+  <p:clrMapOvr>
+    <a:masterClrMapping/>
+  </p:clrMapOvr>
+</p:sld>
+</file>
+
+<file path=ppt/slides/slide4.xml><?xml version="1.0" encoding="utf-8"?>
+<p:sld xmlns:a="http://schemas.openxmlformats.org/drawingml/2006/main" xmlns:r="http://schemas.openxmlformats.org/officeDocument/2006/relationships" xmlns:p="http://schemas.openxmlformats.org/presentationml/2006/main">
+  <p:cSld>
+    <p:spTree>
+      <p:nvGrpSpPr>
+        <p:cNvPr id="1" name=""/>
+        <p:cNvGrpSpPr/>
+        <p:nvPr/>
+      </p:nvGrpSpPr>
+      <p:grpSpPr>
+        <a:xfrm>
+          <a:off x="0" y="0"/>
+          <a:ext cx="0" cy="0"/>
+          <a:chOff x="0" y="0"/>
+          <a:chExt cx="0" cy="0"/>
+        </a:xfrm>
+      </p:grpSpPr>
+      <p:graphicFrame>
+        <p:nvGraphicFramePr>
+          <p:cNvPr id="5" name="4 Tabla"/>
+          <p:cNvGraphicFramePr>
+            <a:graphicFrameLocks noGrp="1"/>
+          </p:cNvGraphicFramePr>
+          <p:nvPr>
+            <p:extLst>
+              <p:ext uri="{D42A27DB-BD31-4B8C-83A1-F6EECF244321}">
+                <p14:modId xmlns:p14="http://schemas.microsoft.com/office/powerpoint/2010/main" val="4220716674"/>
+              </p:ext>
+            </p:extLst>
+          </p:nvPr>
+        </p:nvGraphicFramePr>
+        <p:xfrm>
+          <a:off x="611560" y="260648"/>
+          <a:ext cx="7776864" cy="4146385"/>
+        </p:xfrm>
+        <a:graphic>
+          <a:graphicData uri="http://schemas.openxmlformats.org/drawingml/2006/table">
+            <a:tbl>
+              <a:tblPr firstRow="1" bandRow="1">
+                <a:tableStyleId>{5C22544A-7EE6-4342-B048-85BDC9FD1C3A}</a:tableStyleId>
+              </a:tblPr>
+              <a:tblGrid>
+                <a:gridCol w="4104456"/>
+                <a:gridCol w="3672408"/>
+              </a:tblGrid>
+              <a:tr h="258577">
+                <a:tc>
+                  <a:txBody>
+                    <a:bodyPr/>
+                    <a:lstStyle/>
+                    <a:p>
+                      <a:endParaRPr lang="es-CO" dirty="0"/>
+                    </a:p>
+                  </a:txBody>
+                  <a:tcPr/>
+                </a:tc>
+                <a:tc>
+                  <a:txBody>
+                    <a:bodyPr/>
+                    <a:lstStyle/>
+                    <a:p>
+                      <a:pPr algn="ctr"/>
+                      <a:r>
+                        <a:rPr lang="es-CO" sz="2800" dirty="0" smtClean="0"/>
+                        <a:t>Soporte técnico</a:t>
+                      </a:r>
+                      <a:endParaRPr lang="es-CO" sz="2800" dirty="0"/>
+                    </a:p>
+                  </a:txBody>
+                  <a:tcPr/>
+                </a:tc>
+              </a:tr>
+              <a:tr h="803651">
+                <a:tc>
+                  <a:txBody>
+                    <a:bodyPr/>
+                    <a:lstStyle/>
+                    <a:p>
+                      <a:r>
+                        <a:rPr lang="es-CO" b="1" dirty="0" smtClean="0"/>
+                        <a:t>Limite</a:t>
+                      </a:r>
+                      <a:r>
+                        <a:rPr lang="es-CO" b="1" baseline="0" dirty="0" smtClean="0"/>
+                        <a:t> de ayudas</a:t>
+                      </a:r>
+                      <a:endParaRPr lang="es-CO" b="1" dirty="0"/>
+                    </a:p>
+                  </a:txBody>
+                  <a:tcPr/>
+                </a:tc>
+                <a:tc>
+                  <a:txBody>
+                    <a:bodyPr/>
+                    <a:lstStyle/>
+                    <a:p>
+                      <a:pPr algn="ctr"/>
+                      <a:r>
+                        <a:rPr lang="es-CO" b="0" dirty="0" smtClean="0"/>
+                        <a:t>Ilimitado</a:t>
+                      </a:r>
+                      <a:endParaRPr lang="es-CO" b="0" dirty="0"/>
+                    </a:p>
+                  </a:txBody>
+                  <a:tcPr/>
+                </a:tc>
+              </a:tr>
+              <a:tr h="432735">
+                <a:tc>
+                  <a:txBody>
+                    <a:bodyPr/>
+                    <a:lstStyle/>
+                    <a:p>
+                      <a:pPr marL="0" marR="0" indent="0" algn="l" defTabSz="914400" rtl="0" eaLnBrk="1" fontAlgn="auto" latinLnBrk="0" hangingPunct="1">
+                        <a:lnSpc>
+                          <a:spcPct val="100000"/>
+                        </a:lnSpc>
+                        <a:spcBef>
+                          <a:spcPts val="0"/>
+                        </a:spcBef>
+                        <a:spcAft>
+                          <a:spcPts val="0"/>
+                        </a:spcAft>
+                        <a:buClrTx/>
+                        <a:buSzTx/>
+                        <a:buFontTx/>
+                        <a:buNone/>
+                        <a:tabLst/>
+                        <a:defRPr/>
+                      </a:pPr>
+                      <a:r>
+                        <a:rPr lang="es-CO" b="1" baseline="0" dirty="0" smtClean="0"/>
+                        <a:t>Tiempo máximo de respuesta</a:t>
+                      </a:r>
+                      <a:endParaRPr lang="es-CO" b="1" dirty="0"/>
+                    </a:p>
+                  </a:txBody>
+                  <a:tcPr/>
+                </a:tc>
+                <a:tc>
+                  <a:txBody>
+                    <a:bodyPr/>
+                    <a:lstStyle/>
+                    <a:p>
+                      <a:pPr algn="ctr"/>
+                      <a:r>
+                        <a:rPr lang="es-CO" b="0" dirty="0" smtClean="0"/>
+                        <a:t>1 día</a:t>
+                      </a:r>
+                      <a:endParaRPr lang="es-CO" b="0" dirty="0"/>
+                    </a:p>
+                  </a:txBody>
+                  <a:tcPr/>
+                </a:tc>
+              </a:tr>
+              <a:tr h="452510">
+                <a:tc>
+                  <a:txBody>
+                    <a:bodyPr/>
+                    <a:lstStyle/>
+                    <a:p>
+                      <a:r>
+                        <a:rPr lang="es-CO" b="1" dirty="0" smtClean="0"/>
+                        <a:t>Tiempo máximo</a:t>
+                      </a:r>
+                      <a:r>
+                        <a:rPr lang="es-CO" b="1" baseline="0" dirty="0" smtClean="0"/>
+                        <a:t> de solución</a:t>
+                      </a:r>
+                      <a:endParaRPr lang="es-CO" b="1" dirty="0"/>
+                    </a:p>
+                  </a:txBody>
+                  <a:tcPr/>
+                </a:tc>
+                <a:tc>
+                  <a:txBody>
+                    <a:bodyPr/>
+                    <a:lstStyle/>
+                    <a:p>
+                      <a:pPr algn="ctr"/>
+                      <a:r>
+                        <a:rPr lang="es-CO" b="0" dirty="0" smtClean="0"/>
+                        <a:t>Dependiendo del nivel de severidad</a:t>
+                      </a:r>
+                      <a:endParaRPr lang="es-CO" b="0" dirty="0"/>
+                    </a:p>
+                  </a:txBody>
+                  <a:tcPr/>
+                </a:tc>
+              </a:tr>
+              <a:tr h="646443">
+                <a:tc>
+                  <a:txBody>
+                    <a:bodyPr/>
+                    <a:lstStyle/>
+                    <a:p>
+                      <a:r>
+                        <a:rPr lang="es-CO" b="1" dirty="0" smtClean="0"/>
+                        <a:t>Horario de</a:t>
+                      </a:r>
+                      <a:r>
+                        <a:rPr lang="es-CO" b="1" baseline="0" dirty="0" smtClean="0"/>
+                        <a:t> atención</a:t>
+                      </a:r>
+                      <a:endParaRPr lang="es-CO" b="1" dirty="0"/>
+                    </a:p>
+                  </a:txBody>
+                  <a:tcPr/>
+                </a:tc>
+                <a:tc>
+                  <a:txBody>
+                    <a:bodyPr/>
+                    <a:lstStyle/>
+                    <a:p>
+                      <a:pPr algn="ctr"/>
+                      <a:r>
+                        <a:rPr lang="es-CO" b="0" dirty="0" smtClean="0"/>
+                        <a:t>Lunes</a:t>
+                      </a:r>
+                      <a:r>
+                        <a:rPr lang="es-CO" b="0" baseline="0" dirty="0" smtClean="0"/>
+                        <a:t> a Viernes</a:t>
+                      </a:r>
+                    </a:p>
+                    <a:p>
+                      <a:pPr algn="ctr"/>
+                      <a:r>
+                        <a:rPr lang="es-CO" b="0" baseline="0" dirty="0" smtClean="0"/>
+                        <a:t>8:00 am – 6:00 pm</a:t>
+                      </a:r>
+                      <a:endParaRPr lang="es-CO" b="0" dirty="0"/>
+                    </a:p>
+                  </a:txBody>
+                  <a:tcPr/>
+                </a:tc>
+              </a:tr>
+              <a:tr h="646443">
+                <a:tc>
+                  <a:txBody>
+                    <a:bodyPr/>
+                    <a:lstStyle/>
+                    <a:p>
+                      <a:r>
+                        <a:rPr lang="es-CO" b="1" dirty="0" smtClean="0"/>
+                        <a:t>Apoyo</a:t>
+                      </a:r>
+                      <a:r>
+                        <a:rPr lang="es-CO" b="1" baseline="0" dirty="0" smtClean="0"/>
+                        <a:t> telefónico</a:t>
+                      </a:r>
+                      <a:endParaRPr lang="es-CO" b="1" dirty="0"/>
+                    </a:p>
+                  </a:txBody>
+                  <a:tcPr/>
+                </a:tc>
+                <a:tc>
+                  <a:txBody>
+                    <a:bodyPr/>
+                    <a:lstStyle/>
+                    <a:p>
+                      <a:pPr algn="ctr"/>
+                      <a:r>
+                        <a:rPr lang="es-CO" b="0" dirty="0" smtClean="0"/>
+                        <a:t>Skype: soporteyoptic</a:t>
+                      </a:r>
+                    </a:p>
+                  </a:txBody>
+                  <a:tcPr/>
+                </a:tc>
+              </a:tr>
+              <a:tr h="646443">
+                <a:tc>
+                  <a:txBody>
+                    <a:bodyPr/>
+                    <a:lstStyle/>
+                    <a:p>
+                      <a:r>
+                        <a:rPr lang="es-CO" b="1" dirty="0" smtClean="0"/>
+                        <a:t>Apoyo</a:t>
+                      </a:r>
+                      <a:r>
+                        <a:rPr lang="es-CO" b="1" baseline="0" dirty="0" smtClean="0"/>
+                        <a:t> por correo electrónico</a:t>
+                      </a:r>
+                      <a:endParaRPr lang="es-CO" b="1" dirty="0"/>
+                    </a:p>
+                  </a:txBody>
+                  <a:tcPr/>
+                </a:tc>
+                <a:tc>
+                  <a:txBody>
+                    <a:bodyPr/>
+                    <a:lstStyle/>
+                    <a:p>
+                      <a:pPr algn="ctr"/>
+                      <a:r>
+                        <a:rPr lang="es-CO" b="0" dirty="0" smtClean="0"/>
+                        <a:t>soporte@yoptic.com</a:t>
+                      </a:r>
+                    </a:p>
+                  </a:txBody>
+                  <a:tcPr/>
+                </a:tc>
+              </a:tr>
+            </a:tbl>
+          </a:graphicData>
+        </a:graphic>
+      </p:graphicFrame>
+      <p:pic>
+        <p:nvPicPr>
+          <p:cNvPr id="6" name="Picture 2" descr="C:\Users\kuper\Downloads\Png\Accept32.png"/>
+          <p:cNvPicPr>
+            <a:picLocks noChangeAspect="1" noChangeArrowheads="1"/>
+          </p:cNvPicPr>
+          <p:nvPr/>
+        </p:nvPicPr>
+        <p:blipFill>
+          <a:blip r:embed="rId2">
+            <a:extLst>
+              <a:ext uri="{28A0092B-C50C-407E-A947-70E740481C1C}">
+                <a14:useLocalDpi xmlns:a14="http://schemas.microsoft.com/office/drawing/2010/main" val="0"/>
+              </a:ext>
+            </a:extLst>
+          </a:blip>
+          <a:srcRect/>
+          <a:stretch>
+            <a:fillRect/>
+          </a:stretch>
+        </p:blipFill>
+        <p:spPr bwMode="auto">
+          <a:xfrm>
+            <a:off x="5084440" y="3204629"/>
+            <a:ext cx="304800" cy="304800"/>
+          </a:xfrm>
+          <a:prstGeom prst="rect">
+            <a:avLst/>
+          </a:prstGeom>
+          <a:noFill/>
+          <a:extLst>
+            <a:ext uri="{909E8E84-426E-40DD-AFC4-6F175D3DCCD1}">
+              <a14:hiddenFill xmlns:a14="http://schemas.microsoft.com/office/drawing/2010/main">
+                <a:solidFill>
+                  <a:srgbClr val="FFFFFF"/>
+                </a:solidFill>
+              </a14:hiddenFill>
+            </a:ext>
+          </a:extLst>
+        </p:spPr>
+      </p:pic>
+      <p:pic>
+        <p:nvPicPr>
+          <p:cNvPr id="7" name="Picture 2" descr="C:\Users\kuper\Downloads\Png\Accept32.png"/>
+          <p:cNvPicPr>
+            <a:picLocks noChangeAspect="1" noChangeArrowheads="1"/>
+          </p:cNvPicPr>
+          <p:nvPr/>
+        </p:nvPicPr>
+        <p:blipFill>
+          <a:blip r:embed="rId2">
+            <a:extLst>
+              <a:ext uri="{28A0092B-C50C-407E-A947-70E740481C1C}">
+                <a14:useLocalDpi xmlns:a14="http://schemas.microsoft.com/office/drawing/2010/main" val="0"/>
+              </a:ext>
+            </a:extLst>
+          </a:blip>
+          <a:srcRect/>
+          <a:stretch>
+            <a:fillRect/>
+          </a:stretch>
+        </p:blipFill>
+        <p:spPr bwMode="auto">
+          <a:xfrm>
+            <a:off x="5084440" y="3838463"/>
+            <a:ext cx="304800" cy="304800"/>
+          </a:xfrm>
+          <a:prstGeom prst="rect">
+            <a:avLst/>
+          </a:prstGeom>
+          <a:noFill/>
+          <a:extLst>
+            <a:ext uri="{909E8E84-426E-40DD-AFC4-6F175D3DCCD1}">
+              <a14:hiddenFill xmlns:a14="http://schemas.microsoft.com/office/drawing/2010/main">
+                <a:solidFill>
+                  <a:srgbClr val="FFFFFF"/>
+                </a:solidFill>
+              </a14:hiddenFill>
+            </a:ext>
+          </a:extLst>
+        </p:spPr>
+      </p:pic>
+    </p:spTree>
+    <p:extLst>
+      <p:ext uri="{BB962C8B-B14F-4D97-AF65-F5344CB8AC3E}">
+        <p14:creationId xmlns:p14="http://schemas.microsoft.com/office/powerpoint/2010/main" val="2341733691"/>
       </p:ext>
     </p:extLst>
   </p:cSld>

</xml_diff>